<commit_message>
mable fixed caption for main region
</commit_message>
<xml_diff>
--- a/journalSwarmControl/pictures/pdf/MainRegions.pptx
+++ b/journalSwarmControl/pictures/pdf/MainRegions.pptx
@@ -208,7 +208,7 @@
           <a:p>
             <a:fld id="{F91B157D-5D23-4C2B-820D-CCD9AF780C09}" type="datetimeFigureOut">
               <a:rPr lang="en-US" smtClean="0"/>
-              <a:t>8/2/2016</a:t>
+              <a:t>8/12/2016</a:t>
             </a:fld>
             <a:endParaRPr lang="en-US"/>
           </a:p>
@@ -606,7 +606,7 @@
           <a:p>
             <a:fld id="{F7080B4D-8004-43E8-A0A5-F0C582AEB8C3}" type="datetimeFigureOut">
               <a:rPr lang="en-US" smtClean="0"/>
-              <a:t>8/2/2016</a:t>
+              <a:t>8/12/2016</a:t>
             </a:fld>
             <a:endParaRPr lang="en-US"/>
           </a:p>
@@ -776,7 +776,7 @@
           <a:p>
             <a:fld id="{F7080B4D-8004-43E8-A0A5-F0C582AEB8C3}" type="datetimeFigureOut">
               <a:rPr lang="en-US" smtClean="0"/>
-              <a:t>8/2/2016</a:t>
+              <a:t>8/12/2016</a:t>
             </a:fld>
             <a:endParaRPr lang="en-US"/>
           </a:p>
@@ -956,7 +956,7 @@
           <a:p>
             <a:fld id="{F7080B4D-8004-43E8-A0A5-F0C582AEB8C3}" type="datetimeFigureOut">
               <a:rPr lang="en-US" smtClean="0"/>
-              <a:t>8/2/2016</a:t>
+              <a:t>8/12/2016</a:t>
             </a:fld>
             <a:endParaRPr lang="en-US"/>
           </a:p>
@@ -1126,7 +1126,7 @@
           <a:p>
             <a:fld id="{F7080B4D-8004-43E8-A0A5-F0C582AEB8C3}" type="datetimeFigureOut">
               <a:rPr lang="en-US" smtClean="0"/>
-              <a:t>8/2/2016</a:t>
+              <a:t>8/12/2016</a:t>
             </a:fld>
             <a:endParaRPr lang="en-US"/>
           </a:p>
@@ -1370,7 +1370,7 @@
           <a:p>
             <a:fld id="{F7080B4D-8004-43E8-A0A5-F0C582AEB8C3}" type="datetimeFigureOut">
               <a:rPr lang="en-US" smtClean="0"/>
-              <a:t>8/2/2016</a:t>
+              <a:t>8/12/2016</a:t>
             </a:fld>
             <a:endParaRPr lang="en-US"/>
           </a:p>
@@ -1602,7 +1602,7 @@
           <a:p>
             <a:fld id="{F7080B4D-8004-43E8-A0A5-F0C582AEB8C3}" type="datetimeFigureOut">
               <a:rPr lang="en-US" smtClean="0"/>
-              <a:t>8/2/2016</a:t>
+              <a:t>8/12/2016</a:t>
             </a:fld>
             <a:endParaRPr lang="en-US"/>
           </a:p>
@@ -1969,7 +1969,7 @@
           <a:p>
             <a:fld id="{F7080B4D-8004-43E8-A0A5-F0C582AEB8C3}" type="datetimeFigureOut">
               <a:rPr lang="en-US" smtClean="0"/>
-              <a:t>8/2/2016</a:t>
+              <a:t>8/12/2016</a:t>
             </a:fld>
             <a:endParaRPr lang="en-US"/>
           </a:p>
@@ -2087,7 +2087,7 @@
           <a:p>
             <a:fld id="{F7080B4D-8004-43E8-A0A5-F0C582AEB8C3}" type="datetimeFigureOut">
               <a:rPr lang="en-US" smtClean="0"/>
-              <a:t>8/2/2016</a:t>
+              <a:t>8/12/2016</a:t>
             </a:fld>
             <a:endParaRPr lang="en-US"/>
           </a:p>
@@ -2182,7 +2182,7 @@
           <a:p>
             <a:fld id="{F7080B4D-8004-43E8-A0A5-F0C582AEB8C3}" type="datetimeFigureOut">
               <a:rPr lang="en-US" smtClean="0"/>
-              <a:t>8/2/2016</a:t>
+              <a:t>8/12/2016</a:t>
             </a:fld>
             <a:endParaRPr lang="en-US"/>
           </a:p>
@@ -2459,7 +2459,7 @@
           <a:p>
             <a:fld id="{F7080B4D-8004-43E8-A0A5-F0C582AEB8C3}" type="datetimeFigureOut">
               <a:rPr lang="en-US" smtClean="0"/>
-              <a:t>8/2/2016</a:t>
+              <a:t>8/12/2016</a:t>
             </a:fld>
             <a:endParaRPr lang="en-US"/>
           </a:p>
@@ -2716,7 +2716,7 @@
           <a:p>
             <a:fld id="{F7080B4D-8004-43E8-A0A5-F0C582AEB8C3}" type="datetimeFigureOut">
               <a:rPr lang="en-US" smtClean="0"/>
-              <a:t>8/2/2016</a:t>
+              <a:t>8/12/2016</a:t>
             </a:fld>
             <a:endParaRPr lang="en-US"/>
           </a:p>
@@ -2929,7 +2929,7 @@
           <a:p>
             <a:fld id="{F7080B4D-8004-43E8-A0A5-F0C582AEB8C3}" type="datetimeFigureOut">
               <a:rPr lang="en-US" smtClean="0"/>
-              <a:t>8/2/2016</a:t>
+              <a:t>8/12/2016</a:t>
             </a:fld>
             <a:endParaRPr lang="en-US"/>
           </a:p>
@@ -3914,7 +3914,7 @@
                 <a:latin typeface="Times New Roman" panose="02020603050405020304" pitchFamily="18" charset="0"/>
                 <a:cs typeface="Times New Roman" panose="02020603050405020304" pitchFamily="18" charset="0"/>
               </a:rPr>
-              <a:t>Goal With Regions</a:t>
+              <a:t>Filtered Mean</a:t>
             </a:r>
           </a:p>
           <a:p>
@@ -3928,7 +3928,7 @@
                 <a:latin typeface="Times New Roman" panose="02020603050405020304" pitchFamily="18" charset="0"/>
                 <a:cs typeface="Times New Roman" panose="02020603050405020304" pitchFamily="18" charset="0"/>
               </a:rPr>
-              <a:t>Goal Without Regions</a:t>
+              <a:t>Mean </a:t>
             </a:r>
           </a:p>
           <a:p>
@@ -3970,7 +3970,7 @@
                 <a:latin typeface="Times New Roman" panose="02020603050405020304" pitchFamily="18" charset="0"/>
                 <a:cs typeface="Times New Roman" panose="02020603050405020304" pitchFamily="18" charset="0"/>
               </a:rPr>
-              <a:t>Robots out of Region</a:t>
+              <a:t>Robots not in Region</a:t>
             </a:r>
           </a:p>
         </p:txBody>

</xml_diff>